<commit_message>
Modify presentation to include test coverage screenshots
</commit_message>
<xml_diff>
--- a/documents/SmileDetectionApp.pptx
+++ b/documents/SmileDetectionApp.pptx
@@ -3969,10 +3969,7 @@
           <a:bodyPr/>
           <a:lstStyle/>
           <a:p>
-            <a:r>
-              <a:rPr lang="en-US" dirty="0"/>
-              <a:t>Hi, I’m Manushi. I’ll walk you through what Smile Detection App does, how it works, and some things I learned along the way.</a:t>
-            </a:r>
+            <a:endParaRPr lang="en-US" dirty="0"/>
           </a:p>
         </p:txBody>
       </p:sp>
@@ -4057,23 +4054,24 @@
           <a:lstStyle/>
           <a:p>
             <a:r>
-              <a:rPr lang="en-US" dirty="0"/>
+              <a:rPr lang="en-US"/>
               <a:t>That’s it!</a:t>
             </a:r>
             <a:br>
-              <a:rPr lang="en-US" dirty="0"/>
+              <a:rPr lang="en-US"/>
             </a:br>
             <a:r>
-              <a:rPr lang="en-US" dirty="0"/>
+              <a:rPr lang="en-US"/>
               <a:t>Thanks so much for taking a look at my project.</a:t>
             </a:r>
             <a:br>
-              <a:rPr lang="en-US" dirty="0"/>
+              <a:rPr lang="en-US"/>
             </a:br>
             <a:r>
-              <a:rPr lang="en-US" dirty="0"/>
+              <a:rPr lang="en-US"/>
               <a:t>If you have any questions, just reach out on GitHub or LinkedIn.</a:t>
             </a:r>
+            <a:endParaRPr lang="en-US" dirty="0"/>
           </a:p>
         </p:txBody>
       </p:sp>
@@ -4157,38 +4155,7 @@
           <a:bodyPr/>
           <a:lstStyle/>
           <a:p>
-            <a:r>
-              <a:rPr lang="en-US" dirty="0"/>
-              <a:t>It’s a full-stack project: the frontend is built in React, the backend is Python with </a:t>
-            </a:r>
-            <a:r>
-              <a:rPr lang="en-US" dirty="0" err="1"/>
-              <a:t>FastAPI</a:t>
-            </a:r>
-            <a:r>
-              <a:rPr lang="en-US" dirty="0"/>
-              <a:t> and OpenCV.</a:t>
-            </a:r>
-            <a:br>
-              <a:rPr lang="en-US" dirty="0"/>
-            </a:br>
-            <a:r>
-              <a:rPr lang="en-US" dirty="0"/>
-              <a:t>Basically, it takes camera frames and detects if you’re smiling in real time.</a:t>
-            </a:r>
-            <a:br>
-              <a:rPr lang="en-US" dirty="0"/>
-            </a:br>
-            <a:r>
-              <a:rPr lang="en-US" dirty="0"/>
-              <a:t>If it finds a smile, it draws a bonding box on the image and saves both the image and the info about the smile into a database.</a:t>
-            </a:r>
-          </a:p>
-          <a:p>
-            <a:r>
-              <a:rPr lang="en-US" dirty="0"/>
-              <a:t>The app features error handling, with all configuration handled via environment variables for easy deployment. Both frontend and backend are well-tested</a:t>
-            </a:r>
+            <a:endParaRPr lang="en-US" dirty="0"/>
           </a:p>
         </p:txBody>
       </p:sp>
@@ -4272,48 +4239,7 @@
           <a:bodyPr/>
           <a:lstStyle/>
           <a:p>
-            <a:r>
-              <a:rPr lang="en-US" dirty="0"/>
-              <a:t>Here’s a high-level architecture diagram.</a:t>
-            </a:r>
-            <a:br>
-              <a:rPr lang="en-US" dirty="0"/>
-            </a:br>
-            <a:br>
-              <a:rPr lang="en-US" dirty="0"/>
-            </a:br>
-            <a:r>
-              <a:rPr lang="en-US" dirty="0"/>
-              <a:t>The user interacts with the React app in the browser.</a:t>
-            </a:r>
-            <a:br>
-              <a:rPr lang="en-US" dirty="0"/>
-            </a:br>
-            <a:r>
-              <a:rPr lang="en-US" dirty="0"/>
-              <a:t>That interacts with the Python backend using simple API calls.</a:t>
-            </a:r>
-            <a:br>
-              <a:rPr lang="en-US" dirty="0"/>
-            </a:br>
-            <a:r>
-              <a:rPr lang="en-US" dirty="0"/>
-              <a:t>The backend handles the camera management, runs the smile detection, and sends only the smile detected image and coordinates data back to the frontend.</a:t>
-            </a:r>
-            <a:br>
-              <a:rPr lang="en-US" dirty="0"/>
-            </a:br>
-            <a:r>
-              <a:rPr lang="en-US" dirty="0"/>
-              <a:t>Anytime a smile is found, it logs that in the database and saves the picture.</a:t>
-            </a:r>
-            <a:br>
-              <a:rPr lang="en-US" dirty="0"/>
-            </a:br>
-            <a:r>
-              <a:rPr lang="en-US" dirty="0"/>
-              <a:t>This setup keeps everything organized and easy to manage.</a:t>
-            </a:r>
+            <a:endParaRPr lang="en-US" dirty="0"/>
           </a:p>
         </p:txBody>
       </p:sp>
@@ -4397,45 +4323,7 @@
           <a:bodyPr/>
           <a:lstStyle/>
           <a:p>
-            <a:r>
-              <a:rPr lang="en-US" dirty="0"/>
-              <a:t>This API flow diagram shows the typical user journey:</a:t>
-            </a:r>
-            <a:br>
-              <a:rPr lang="en-US" dirty="0"/>
-            </a:br>
-            <a:r>
-              <a:rPr lang="en-US" dirty="0"/>
-              <a:t>First, the frontend sends a request to start the camera.</a:t>
-            </a:r>
-            <a:br>
-              <a:rPr lang="en-US" dirty="0"/>
-            </a:br>
-            <a:r>
-              <a:rPr lang="en-US" dirty="0"/>
-              <a:t>While the camera session is running, the app requests the backend every second to check for smiles in the video feed.</a:t>
-            </a:r>
-            <a:br>
-              <a:rPr lang="en-US" dirty="0"/>
-            </a:br>
-            <a:r>
-              <a:rPr lang="en-US" dirty="0"/>
-              <a:t>If a smile is detected, the backend responds with an image and metadata; if not, it returns a status message.</a:t>
-            </a:r>
-            <a:br>
-              <a:rPr lang="en-US" dirty="0"/>
-            </a:br>
-            <a:r>
-              <a:rPr lang="en-US" dirty="0"/>
-              <a:t>When finished, the frontend stops the camera and the backend releases all resources.</a:t>
-            </a:r>
-            <a:br>
-              <a:rPr lang="en-US" dirty="0"/>
-            </a:br>
-            <a:r>
-              <a:rPr lang="en-US" dirty="0"/>
-              <a:t>All errors, such as trying to detect a smile when the camera isn’t running, are handled gracefully and reported to the user.</a:t>
-            </a:r>
+            <a:endParaRPr lang="en-US" dirty="0"/>
           </a:p>
         </p:txBody>
       </p:sp>
@@ -4519,62 +4407,6 @@
           <a:bodyPr/>
           <a:lstStyle/>
           <a:p>
-            <a:pPr>
-              <a:buNone/>
-            </a:pPr>
-            <a:r>
-              <a:rPr lang="en-US" dirty="0"/>
-              <a:t>A few things I want to highlight in the code:</a:t>
-            </a:r>
-          </a:p>
-          <a:p>
-            <a:pPr>
-              <a:buFont typeface="Arial" panose="020B0604020202020204" pitchFamily="34" charset="0"/>
-              <a:buChar char="•"/>
-            </a:pPr>
-            <a:r>
-              <a:rPr lang="en-US" dirty="0"/>
-              <a:t>I use the singleton pattern for camera management, guaranteeing only one camera instance is ever active. This avoids resource conflicts and leaks.</a:t>
-            </a:r>
-          </a:p>
-          <a:p>
-            <a:pPr>
-              <a:buFont typeface="Arial" panose="020B0604020202020204" pitchFamily="34" charset="0"/>
-              <a:buChar char="•"/>
-            </a:pPr>
-            <a:r>
-              <a:rPr lang="en-US" dirty="0"/>
-              <a:t>Dependency injection is used in the detection logic, making it easy to mock OpenCV components for unit testing.</a:t>
-            </a:r>
-          </a:p>
-          <a:p>
-            <a:pPr>
-              <a:buFont typeface="Arial" panose="020B0604020202020204" pitchFamily="34" charset="0"/>
-              <a:buChar char="•"/>
-            </a:pPr>
-            <a:r>
-              <a:rPr lang="en-US" dirty="0"/>
-              <a:t>Each module has a clear responsibility: camera management, smile detection, and event logging are all separated.</a:t>
-            </a:r>
-          </a:p>
-          <a:p>
-            <a:pPr>
-              <a:buFont typeface="Arial" panose="020B0604020202020204" pitchFamily="34" charset="0"/>
-              <a:buChar char="•"/>
-            </a:pPr>
-            <a:r>
-              <a:rPr lang="en-US" dirty="0"/>
-              <a:t>And finally, all paths—like database or image directories—can be set via environment variables, so the app is portable and easy to configure</a:t>
-            </a:r>
-          </a:p>
-          <a:p>
-            <a:pPr>
-              <a:buFont typeface="Arial" panose="020B0604020202020204" pitchFamily="34" charset="0"/>
-              <a:buChar char="•"/>
-            </a:pPr>
-            <a:endParaRPr lang="en-US" dirty="0"/>
-          </a:p>
-          <a:p>
             <a:endParaRPr lang="en-US" dirty="0"/>
           </a:p>
         </p:txBody>
@@ -4662,48 +4494,7 @@
             <a:pPr>
               <a:buNone/>
             </a:pPr>
-            <a:r>
-              <a:rPr lang="en-US" dirty="0"/>
-              <a:t>I’ve focused a lot on testing to ensure reliability:</a:t>
-            </a:r>
-          </a:p>
-          <a:p>
-            <a:pPr>
-              <a:buFont typeface="Arial" panose="020B0604020202020204" pitchFamily="34" charset="0"/>
-              <a:buChar char="•"/>
-            </a:pPr>
-            <a:r>
-              <a:rPr lang="en-US" dirty="0"/>
-              <a:t>On the frontend, I have over 90% test coverage using Jest and React Testing Library. All main UI flows—like starting, stopping, error handling, and image rendering—are covered.</a:t>
-            </a:r>
-          </a:p>
-          <a:p>
-            <a:pPr>
-              <a:buFont typeface="Arial" panose="020B0604020202020204" pitchFamily="34" charset="0"/>
-              <a:buChar char="•"/>
-            </a:pPr>
-            <a:r>
-              <a:rPr lang="en-US" dirty="0"/>
-              <a:t>On the backend, I use </a:t>
-            </a:r>
-            <a:r>
-              <a:rPr lang="en-US" dirty="0" err="1"/>
-              <a:t>Pytest</a:t>
-            </a:r>
-            <a:r>
-              <a:rPr lang="en-US" dirty="0"/>
-              <a:t> with mocking to test all components in isolation, including camera logic, detection, routes, and database handling.</a:t>
-            </a:r>
-          </a:p>
-          <a:p>
-            <a:pPr>
-              <a:buFont typeface="Arial" panose="020B0604020202020204" pitchFamily="34" charset="0"/>
-              <a:buChar char="•"/>
-            </a:pPr>
-            <a:r>
-              <a:rPr lang="en-US" dirty="0"/>
-              <a:t>The project is CI-ready, so tests and linting run automatically to maintain code quality.</a:t>
-            </a:r>
+            <a:endParaRPr lang="en-US" dirty="0"/>
           </a:p>
         </p:txBody>
       </p:sp>
@@ -4787,22 +4578,6 @@
           <a:bodyPr/>
           <a:lstStyle/>
           <a:p>
-            <a:r>
-              <a:rPr lang="en-US" dirty="0"/>
-              <a:t>Here’s the SQLite table schema for detection events.</a:t>
-            </a:r>
-          </a:p>
-          <a:p>
-            <a:br>
-              <a:rPr lang="en-US" dirty="0"/>
-            </a:br>
-            <a:r>
-              <a:rPr lang="en-US" dirty="0"/>
-              <a:t>Every record has an ID, the timestamp, and the smile coordinates saved as JSON.</a:t>
-            </a:r>
-            <a:br>
-              <a:rPr lang="en-US" dirty="0"/>
-            </a:br>
             <a:endParaRPr lang="en-US" dirty="0"/>
           </a:p>
         </p:txBody>
@@ -4887,78 +4662,6 @@
           <a:bodyPr/>
           <a:lstStyle/>
           <a:p>
-            <a:pPr marL="0" marR="0" lvl="0" indent="0" algn="l" defTabSz="914400" rtl="0" eaLnBrk="1" fontAlgn="auto" latinLnBrk="0" hangingPunct="1">
-              <a:lnSpc>
-                <a:spcPct val="100000"/>
-              </a:lnSpc>
-              <a:spcBef>
-                <a:spcPts val="0"/>
-              </a:spcBef>
-              <a:spcAft>
-                <a:spcPts val="0"/>
-              </a:spcAft>
-              <a:buClrTx/>
-              <a:buSzTx/>
-              <a:buFontTx/>
-              <a:buNone/>
-              <a:tabLst/>
-              <a:defRPr/>
-            </a:pPr>
-            <a:r>
-              <a:rPr lang="en-US" dirty="0"/>
-              <a:t>Some quick lessons:</a:t>
-            </a:r>
-          </a:p>
-          <a:p>
-            <a:pPr>
-              <a:buNone/>
-            </a:pPr>
-            <a:br>
-              <a:rPr lang="en-US" dirty="0"/>
-            </a:br>
-            <a:r>
-              <a:rPr lang="en-US" b="1" dirty="0"/>
-              <a:t>Haar cascades are very sensitive</a:t>
-            </a:r>
-            <a:r>
-              <a:rPr lang="en-US" dirty="0"/>
-              <a:t> — not just to lighting and face angle, but also to anything that might “confuse” the detector, like glasses, mustaches, or even heavy beards. Sometimes the app thinks a mustache is a smile, or it just misses a smile if you’re wearing glasses and there’s glare.</a:t>
-            </a:r>
-          </a:p>
-          <a:p>
-            <a:pPr>
-              <a:buNone/>
-            </a:pPr>
-            <a:endParaRPr lang="en-US" dirty="0"/>
-          </a:p>
-          <a:p>
-            <a:pPr>
-              <a:buNone/>
-            </a:pPr>
-            <a:r>
-              <a:rPr lang="en-US" dirty="0"/>
-              <a:t>Managing the camera safely across threads required careful use of locks and singleton patterns.</a:t>
-            </a:r>
-          </a:p>
-          <a:p>
-            <a:pPr>
-              <a:buNone/>
-            </a:pPr>
-            <a:r>
-              <a:rPr lang="en-US" dirty="0"/>
-              <a:t>For reliable testing, I had to mock both the OpenCV components and the database to keep tests isolated and repeatable.</a:t>
-            </a:r>
-          </a:p>
-          <a:p>
-            <a:r>
-              <a:rPr lang="en-US" dirty="0"/>
-              <a:t>And finally, balancing real-time performance with maintainable, testable code was a key focus throughout.</a:t>
-            </a:r>
-          </a:p>
-          <a:p>
-            <a:endParaRPr lang="en-US" dirty="0"/>
-          </a:p>
-          <a:p>
             <a:endParaRPr lang="en-US" dirty="0"/>
           </a:p>
         </p:txBody>
@@ -5042,65 +4745,6 @@
         <p:txBody>
           <a:bodyPr/>
           <a:lstStyle/>
-          <a:p>
-            <a:pPr>
-              <a:buNone/>
-            </a:pPr>
-            <a:r>
-              <a:rPr lang="en-US" dirty="0"/>
-              <a:t>A few things I’d add next:</a:t>
-            </a:r>
-          </a:p>
-          <a:p>
-            <a:pPr>
-              <a:buFont typeface="Arial" panose="020B0604020202020204" pitchFamily="34" charset="0"/>
-              <a:buChar char="•"/>
-            </a:pPr>
-            <a:r>
-              <a:rPr lang="en-US" dirty="0"/>
-              <a:t>Swap out Haar cascades for something more accurate, like </a:t>
-            </a:r>
-            <a:r>
-              <a:rPr lang="en-US" dirty="0" err="1"/>
-              <a:t>MediaPipe</a:t>
-            </a:r>
-            <a:r>
-              <a:rPr lang="en-US" dirty="0"/>
-              <a:t> or </a:t>
-            </a:r>
-            <a:r>
-              <a:rPr lang="en-US" dirty="0" err="1"/>
-              <a:t>Dlib</a:t>
-            </a:r>
-            <a:endParaRPr lang="en-US" dirty="0"/>
-          </a:p>
-          <a:p>
-            <a:pPr>
-              <a:buFont typeface="Arial" panose="020B0604020202020204" pitchFamily="34" charset="0"/>
-              <a:buChar char="•"/>
-            </a:pPr>
-            <a:r>
-              <a:rPr lang="en-US" dirty="0"/>
-              <a:t>Package everything up in Docker so it’s easier to deploy</a:t>
-            </a:r>
-          </a:p>
-          <a:p>
-            <a:pPr>
-              <a:buFont typeface="Arial" panose="020B0604020202020204" pitchFamily="34" charset="0"/>
-              <a:buChar char="•"/>
-            </a:pPr>
-            <a:r>
-              <a:rPr lang="en-US" dirty="0"/>
-              <a:t>Add the ability to upload photos or run smile detection on a video file</a:t>
-            </a:r>
-          </a:p>
-          <a:p>
-            <a:pPr>
-              <a:buFont typeface="Arial" panose="020B0604020202020204" pitchFamily="34" charset="0"/>
-              <a:buChar char="•"/>
-            </a:pPr>
-            <a:endParaRPr lang="en-US" dirty="0"/>
-          </a:p>
           <a:p>
             <a:endParaRPr lang="en-US" dirty="0"/>
           </a:p>
@@ -13312,7 +12956,7 @@
               </a:spcAft>
             </a:pPr>
             <a:r>
-              <a:rPr kumimoji="0" lang="en-US" altLang="en-US" sz="1700" b="1" i="0" u="none" strike="noStrike" cap="none" normalizeH="0" baseline="0" dirty="0">
+              <a:rPr kumimoji="0" lang="en-US" altLang="en-US" sz="1700" b="1" i="0" u="none" strike="noStrike" cap="none" normalizeH="0" baseline="0">
                 <a:ln>
                   <a:noFill/>
                 </a:ln>
@@ -13321,7 +12965,7 @@
               </a:rPr>
               <a:t>Frontend:</a:t>
             </a:r>
-            <a:endParaRPr kumimoji="0" lang="en-US" altLang="en-US" sz="1700" b="0" i="0" u="none" strike="noStrike" cap="none" normalizeH="0" baseline="0" dirty="0">
+            <a:endParaRPr kumimoji="0" lang="en-US" altLang="en-US" sz="1700" b="0" i="0" u="none" strike="noStrike" cap="none" normalizeH="0" baseline="0">
               <a:ln>
                 <a:noFill/>
               </a:ln>
@@ -13339,7 +12983,7 @@
               </a:spcAft>
             </a:pPr>
             <a:r>
-              <a:rPr kumimoji="0" lang="en-US" altLang="en-US" sz="1700" b="0" i="0" u="none" strike="noStrike" cap="none" normalizeH="0" baseline="0" dirty="0">
+              <a:rPr kumimoji="0" lang="en-US" altLang="en-US" sz="1700" b="0" i="0" u="none" strike="noStrike" cap="none" normalizeH="0" baseline="0">
                 <a:ln>
                   <a:noFill/>
                 </a:ln>
@@ -13359,7 +13003,7 @@
               </a:spcAft>
             </a:pPr>
             <a:r>
-              <a:rPr kumimoji="0" lang="en-US" altLang="en-US" sz="1700" b="0" i="0" u="none" strike="noStrike" cap="none" normalizeH="0" baseline="0" dirty="0">
+              <a:rPr kumimoji="0" lang="en-US" altLang="en-US" sz="1700" b="0" i="0" u="none" strike="noStrike" cap="none" normalizeH="0" baseline="0">
                 <a:ln>
                   <a:noFill/>
                 </a:ln>
@@ -13379,7 +13023,7 @@
               </a:spcAft>
             </a:pPr>
             <a:r>
-              <a:rPr kumimoji="0" lang="en-US" altLang="en-US" sz="1700" b="1" i="0" u="none" strike="noStrike" cap="none" normalizeH="0" baseline="0" dirty="0">
+              <a:rPr kumimoji="0" lang="en-US" altLang="en-US" sz="1700" b="1" i="0" u="none" strike="noStrike" cap="none" normalizeH="0" baseline="0">
                 <a:ln>
                   <a:noFill/>
                 </a:ln>
@@ -13388,7 +13032,7 @@
               </a:rPr>
               <a:t>Backend:</a:t>
             </a:r>
-            <a:endParaRPr kumimoji="0" lang="en-US" altLang="en-US" sz="1700" b="0" i="0" u="none" strike="noStrike" cap="none" normalizeH="0" baseline="0" dirty="0">
+            <a:endParaRPr kumimoji="0" lang="en-US" altLang="en-US" sz="1700" b="0" i="0" u="none" strike="noStrike" cap="none" normalizeH="0" baseline="0">
               <a:ln>
                 <a:noFill/>
               </a:ln>
@@ -13406,24 +13050,14 @@
               </a:spcAft>
             </a:pPr>
             <a:r>
-              <a:rPr kumimoji="0" lang="en-US" altLang="en-US" sz="1700" b="0" i="0" u="none" strike="noStrike" cap="none" normalizeH="0" baseline="0" dirty="0" err="1">
+              <a:rPr kumimoji="0" lang="en-US" altLang="en-US" sz="1700" b="0" i="0" u="none" strike="noStrike" cap="none" normalizeH="0" baseline="0">
                 <a:ln>
                   <a:noFill/>
                 </a:ln>
                 <a:effectLst/>
                 <a:latin typeface="Arial" panose="020B0604020202020204" pitchFamily="34" charset="0"/>
               </a:rPr>
-              <a:t>Pytest</a:t>
-            </a:r>
-            <a:r>
-              <a:rPr kumimoji="0" lang="en-US" altLang="en-US" sz="1700" b="0" i="0" u="none" strike="noStrike" cap="none" normalizeH="0" baseline="0" dirty="0">
-                <a:ln>
-                  <a:noFill/>
-                </a:ln>
-                <a:effectLst/>
-                <a:latin typeface="Arial" panose="020B0604020202020204" pitchFamily="34" charset="0"/>
-              </a:rPr>
-              <a:t> for unit/integration (camera, detection, routes, DB)</a:t>
+              <a:t>Pytest for unit/integration (camera, detection, routes, DB)</a:t>
             </a:r>
           </a:p>
           <a:p>
@@ -13436,7 +13070,7 @@
               </a:spcAft>
             </a:pPr>
             <a:r>
-              <a:rPr kumimoji="0" lang="en-US" altLang="en-US" sz="1700" b="0" i="0" u="none" strike="noStrike" cap="none" normalizeH="0" baseline="0" dirty="0">
+              <a:rPr kumimoji="0" lang="en-US" altLang="en-US" sz="1700" b="0" i="0" u="none" strike="noStrike" cap="none" normalizeH="0" baseline="0">
                 <a:ln>
                   <a:noFill/>
                 </a:ln>
@@ -13456,7 +13090,7 @@
               </a:spcAft>
             </a:pPr>
             <a:r>
-              <a:rPr kumimoji="0" lang="en-US" altLang="en-US" sz="1700" b="1" i="0" u="none" strike="noStrike" cap="none" normalizeH="0" baseline="0" dirty="0">
+              <a:rPr kumimoji="0" lang="en-US" altLang="en-US" sz="1700" b="1" i="0" u="none" strike="noStrike" cap="none" normalizeH="0" baseline="0">
                 <a:ln>
                   <a:noFill/>
                 </a:ln>
@@ -13465,7 +13099,7 @@
               </a:rPr>
               <a:t>Continuous Integration Ready:</a:t>
             </a:r>
-            <a:endParaRPr kumimoji="0" lang="en-US" altLang="en-US" sz="1700" b="0" i="0" u="none" strike="noStrike" cap="none" normalizeH="0" baseline="0" dirty="0">
+            <a:endParaRPr kumimoji="0" lang="en-US" altLang="en-US" sz="1700" b="0" i="0" u="none" strike="noStrike" cap="none" normalizeH="0" baseline="0">
               <a:ln>
                 <a:noFill/>
               </a:ln>
@@ -13483,7 +13117,7 @@
               </a:spcAft>
             </a:pPr>
             <a:r>
-              <a:rPr kumimoji="0" lang="en-US" altLang="en-US" sz="1700" b="0" i="0" u="none" strike="noStrike" cap="none" normalizeH="0" baseline="0" dirty="0">
+              <a:rPr kumimoji="0" lang="en-US" altLang="en-US" sz="1700" b="0" i="0" u="none" strike="noStrike" cap="none" normalizeH="0" baseline="0">
                 <a:ln>
                   <a:noFill/>
                 </a:ln>
@@ -13503,7 +13137,7 @@
               </a:spcAft>
             </a:pPr>
             <a:r>
-              <a:rPr kumimoji="0" lang="en-US" altLang="en-US" sz="1700" b="0" i="0" u="none" strike="noStrike" cap="none" normalizeH="0" baseline="0" dirty="0">
+              <a:rPr kumimoji="0" lang="en-US" altLang="en-US" sz="1700" b="0" i="0" u="none" strike="noStrike" cap="none" normalizeH="0" baseline="0">
                 <a:ln>
                   <a:noFill/>
                 </a:ln>
@@ -13539,10 +13173,10 @@
       </p:sp>
       <p:pic>
         <p:nvPicPr>
-          <p:cNvPr id="8" name="Picture 7">
+          <p:cNvPr id="5" name="Picture 4">
             <a:extLst>
               <a:ext uri="{FF2B5EF4-FFF2-40B4-BE49-F238E27FC236}">
-                <a16:creationId xmlns:a16="http://schemas.microsoft.com/office/drawing/2014/main" id="{B7262522-D9CC-B0BA-FC58-4C9D84F62791}"/>
+                <a16:creationId xmlns:a16="http://schemas.microsoft.com/office/drawing/2014/main" id="{75F78D56-DFFB-7240-EFF4-AAAFAFE7DC8C}"/>
               </a:ext>
             </a:extLst>
           </p:cNvPr>
@@ -13559,8 +13193,8 @@
         </p:blipFill>
         <p:spPr>
           <a:xfrm>
-            <a:off x="8517108" y="1179500"/>
-            <a:ext cx="3339249" cy="1333111"/>
+            <a:off x="8517108" y="1127760"/>
+            <a:ext cx="3339249" cy="1323389"/>
           </a:xfrm>
           <a:prstGeom prst="rect">
             <a:avLst/>
@@ -13569,10 +13203,10 @@
       </p:pic>
       <p:pic>
         <p:nvPicPr>
-          <p:cNvPr id="10" name="Picture 9">
+          <p:cNvPr id="11" name="Picture 10">
             <a:extLst>
               <a:ext uri="{FF2B5EF4-FFF2-40B4-BE49-F238E27FC236}">
-                <a16:creationId xmlns:a16="http://schemas.microsoft.com/office/drawing/2014/main" id="{EC62408D-C575-475C-E46B-FF78AB5A8E7B}"/>
+                <a16:creationId xmlns:a16="http://schemas.microsoft.com/office/drawing/2014/main" id="{9B30E435-AFB3-4A7C-BD4B-AFAFBF07BFD7}"/>
               </a:ext>
             </a:extLst>
           </p:cNvPr>
@@ -13589,8 +13223,8 @@
         </p:blipFill>
         <p:spPr>
           <a:xfrm>
-            <a:off x="8517108" y="2756799"/>
-            <a:ext cx="3339249" cy="1449441"/>
+            <a:off x="8517108" y="2822624"/>
+            <a:ext cx="3339249" cy="1414096"/>
           </a:xfrm>
           <a:prstGeom prst="rect">
             <a:avLst/>

</xml_diff>